<commit_message>
update the completed sections
</commit_message>
<xml_diff>
--- a/cloud-clusters/template/cover.pptx
+++ b/cloud-clusters/template/cover.pptx
@@ -5767,9 +5767,20 @@
           <a:p>
             <a:r>
               <a:rPr lang="en-US" sz="7200" b="1" dirty="0" smtClean="0"/>
-              <a:t>Cloud Clusters</a:t>
-            </a:r>
-            <a:endParaRPr lang="en-US" sz="7200" b="1" dirty="0"/>
+              <a:t>Cloud </a:t>
+            </a:r>
+            <a:r>
+              <a:rPr lang="en-US" sz="7200" b="1" dirty="0" smtClean="0"/>
+              <a:t>Clusters</a:t>
+            </a:r>
+            <a:br>
+              <a:rPr lang="en-US" sz="7200" b="1" dirty="0" smtClean="0"/>
+            </a:br>
+            <a:r>
+              <a:rPr lang="en-US" sz="4000" b="1" i="1" dirty="0" smtClean="0"/>
+              <a:t>Class Policies</a:t>
+            </a:r>
+            <a:endParaRPr lang="en-US" sz="4000" b="1" i="1" dirty="0"/>
           </a:p>
         </p:txBody>
       </p:sp>

</xml_diff>